<commit_message>
3_embedded -> bootloader 추가
</commit_message>
<xml_diff>
--- a/static/assets/3_embedded_img.pptx
+++ b/static/assets/3_embedded_img.pptx
@@ -6,10 +6,11 @@
     <p:sldMasterId id="2147483660" r:id="rId2"/>
   </p:sldMasterIdLst>
   <p:notesMasterIdLst>
-    <p:notesMasterId r:id="rId4"/>
+    <p:notesMasterId r:id="rId5"/>
   </p:notesMasterIdLst>
   <p:sldIdLst>
     <p:sldId id="358" r:id="rId3"/>
+    <p:sldId id="359" r:id="rId4"/>
   </p:sldIdLst>
   <p:sldSz cx="18288000" cy="14039850"/>
   <p:notesSz cx="6858000" cy="9144000"/>
@@ -217,7 +218,7 @@
           <a:p>
             <a:fld id="{CABFA58B-201B-41D2-AA3E-28483B84FD7B}" type="datetimeFigureOut">
               <a:rPr lang="ko-KR" altLang="en-US" smtClean="0"/>
-              <a:t>2022-03-08</a:t>
+              <a:t>2022-03-14</a:t>
             </a:fld>
             <a:endParaRPr lang="ko-KR" altLang="en-US"/>
           </a:p>
@@ -663,7 +664,7 @@
           <a:p>
             <a:fld id="{C33163C4-65CF-48D2-8124-E2CEDBD7A0C5}" type="datetimeFigureOut">
               <a:rPr lang="ko-KR" altLang="en-US" smtClean="0"/>
-              <a:t>2022-03-08</a:t>
+              <a:t>2022-03-14</a:t>
             </a:fld>
             <a:endParaRPr lang="ko-KR" altLang="en-US"/>
           </a:p>
@@ -985,7 +986,7 @@
           <a:p>
             <a:fld id="{C33163C4-65CF-48D2-8124-E2CEDBD7A0C5}" type="datetimeFigureOut">
               <a:rPr lang="ko-KR" altLang="en-US" smtClean="0"/>
-              <a:t>2022-03-08</a:t>
+              <a:t>2022-03-14</a:t>
             </a:fld>
             <a:endParaRPr lang="ko-KR" altLang="en-US"/>
           </a:p>
@@ -1163,7 +1164,7 @@
           <a:p>
             <a:fld id="{C33163C4-65CF-48D2-8124-E2CEDBD7A0C5}" type="datetimeFigureOut">
               <a:rPr lang="ko-KR" altLang="en-US" smtClean="0"/>
-              <a:t>2022-03-08</a:t>
+              <a:t>2022-03-14</a:t>
             </a:fld>
             <a:endParaRPr lang="ko-KR" altLang="en-US"/>
           </a:p>
@@ -1403,7 +1404,7 @@
           <a:p>
             <a:fld id="{29936F60-83FB-4643-B7D2-F169DF4090A4}" type="datetimeFigureOut">
               <a:rPr lang="ko-KR" altLang="en-US" smtClean="0"/>
-              <a:t>2022-03-08</a:t>
+              <a:t>2022-03-14</a:t>
             </a:fld>
             <a:endParaRPr lang="ko-KR" altLang="en-US"/>
           </a:p>
@@ -1571,7 +1572,7 @@
           <a:p>
             <a:fld id="{29936F60-83FB-4643-B7D2-F169DF4090A4}" type="datetimeFigureOut">
               <a:rPr lang="ko-KR" altLang="en-US" smtClean="0"/>
-              <a:t>2022-03-08</a:t>
+              <a:t>2022-03-14</a:t>
             </a:fld>
             <a:endParaRPr lang="ko-KR" altLang="en-US"/>
           </a:p>
@@ -1816,7 +1817,7 @@
           <a:p>
             <a:fld id="{29936F60-83FB-4643-B7D2-F169DF4090A4}" type="datetimeFigureOut">
               <a:rPr lang="ko-KR" altLang="en-US" smtClean="0"/>
-              <a:t>2022-03-08</a:t>
+              <a:t>2022-03-14</a:t>
             </a:fld>
             <a:endParaRPr lang="ko-KR" altLang="en-US"/>
           </a:p>
@@ -2101,7 +2102,7 @@
           <a:p>
             <a:fld id="{29936F60-83FB-4643-B7D2-F169DF4090A4}" type="datetimeFigureOut">
               <a:rPr lang="ko-KR" altLang="en-US" smtClean="0"/>
-              <a:t>2022-03-08</a:t>
+              <a:t>2022-03-14</a:t>
             </a:fld>
             <a:endParaRPr lang="ko-KR" altLang="en-US"/>
           </a:p>
@@ -2520,7 +2521,7 @@
           <a:p>
             <a:fld id="{29936F60-83FB-4643-B7D2-F169DF4090A4}" type="datetimeFigureOut">
               <a:rPr lang="ko-KR" altLang="en-US" smtClean="0"/>
-              <a:t>2022-03-08</a:t>
+              <a:t>2022-03-14</a:t>
             </a:fld>
             <a:endParaRPr lang="ko-KR" altLang="en-US"/>
           </a:p>
@@ -2637,7 +2638,7 @@
           <a:p>
             <a:fld id="{29936F60-83FB-4643-B7D2-F169DF4090A4}" type="datetimeFigureOut">
               <a:rPr lang="ko-KR" altLang="en-US" smtClean="0"/>
-              <a:t>2022-03-08</a:t>
+              <a:t>2022-03-14</a:t>
             </a:fld>
             <a:endParaRPr lang="ko-KR" altLang="en-US"/>
           </a:p>
@@ -2732,7 +2733,7 @@
           <a:p>
             <a:fld id="{29936F60-83FB-4643-B7D2-F169DF4090A4}" type="datetimeFigureOut">
               <a:rPr lang="ko-KR" altLang="en-US" smtClean="0"/>
-              <a:t>2022-03-08</a:t>
+              <a:t>2022-03-14</a:t>
             </a:fld>
             <a:endParaRPr lang="ko-KR" altLang="en-US"/>
           </a:p>
@@ -3007,7 +3008,7 @@
           <a:p>
             <a:fld id="{29936F60-83FB-4643-B7D2-F169DF4090A4}" type="datetimeFigureOut">
               <a:rPr lang="ko-KR" altLang="en-US" smtClean="0"/>
-              <a:t>2022-03-08</a:t>
+              <a:t>2022-03-14</a:t>
             </a:fld>
             <a:endParaRPr lang="ko-KR" altLang="en-US"/>
           </a:p>
@@ -3197,7 +3198,7 @@
           <a:p>
             <a:fld id="{C33163C4-65CF-48D2-8124-E2CEDBD7A0C5}" type="datetimeFigureOut">
               <a:rPr lang="ko-KR" altLang="en-US" smtClean="0"/>
-              <a:t>2022-03-08</a:t>
+              <a:t>2022-03-14</a:t>
             </a:fld>
             <a:endParaRPr lang="ko-KR" altLang="en-US"/>
           </a:p>
@@ -3810,7 +3811,7 @@
           <a:p>
             <a:fld id="{29936F60-83FB-4643-B7D2-F169DF4090A4}" type="datetimeFigureOut">
               <a:rPr lang="ko-KR" altLang="en-US" smtClean="0"/>
-              <a:t>2022-03-08</a:t>
+              <a:t>2022-03-14</a:t>
             </a:fld>
             <a:endParaRPr lang="ko-KR" altLang="en-US"/>
           </a:p>
@@ -3978,7 +3979,7 @@
           <a:p>
             <a:fld id="{29936F60-83FB-4643-B7D2-F169DF4090A4}" type="datetimeFigureOut">
               <a:rPr lang="ko-KR" altLang="en-US" smtClean="0"/>
-              <a:t>2022-03-08</a:t>
+              <a:t>2022-03-14</a:t>
             </a:fld>
             <a:endParaRPr lang="ko-KR" altLang="en-US"/>
           </a:p>
@@ -4156,7 +4157,7 @@
           <a:p>
             <a:fld id="{29936F60-83FB-4643-B7D2-F169DF4090A4}" type="datetimeFigureOut">
               <a:rPr lang="ko-KR" altLang="en-US" smtClean="0"/>
-              <a:t>2022-03-08</a:t>
+              <a:t>2022-03-14</a:t>
             </a:fld>
             <a:endParaRPr lang="ko-KR" altLang="en-US"/>
           </a:p>
@@ -4401,7 +4402,7 @@
           <a:p>
             <a:fld id="{C33163C4-65CF-48D2-8124-E2CEDBD7A0C5}" type="datetimeFigureOut">
               <a:rPr lang="ko-KR" altLang="en-US" smtClean="0"/>
-              <a:t>2022-03-08</a:t>
+              <a:t>2022-03-14</a:t>
             </a:fld>
             <a:endParaRPr lang="ko-KR" altLang="en-US"/>
           </a:p>
@@ -4527,7 +4528,7 @@
           <a:p>
             <a:fld id="{C33163C4-65CF-48D2-8124-E2CEDBD7A0C5}" type="datetimeFigureOut">
               <a:rPr lang="ko-KR" altLang="en-US" smtClean="0"/>
-              <a:t>2022-03-08</a:t>
+              <a:t>2022-03-14</a:t>
             </a:fld>
             <a:endParaRPr lang="ko-KR" altLang="en-US"/>
           </a:p>
@@ -5430,7 +5431,7 @@
           <a:p>
             <a:fld id="{C33163C4-65CF-48D2-8124-E2CEDBD7A0C5}" type="datetimeFigureOut">
               <a:rPr lang="ko-KR" altLang="en-US" smtClean="0"/>
-              <a:t>2022-03-08</a:t>
+              <a:t>2022-03-14</a:t>
             </a:fld>
             <a:endParaRPr lang="ko-KR" altLang="en-US"/>
           </a:p>
@@ -5547,7 +5548,7 @@
           <a:p>
             <a:fld id="{C33163C4-65CF-48D2-8124-E2CEDBD7A0C5}" type="datetimeFigureOut">
               <a:rPr lang="ko-KR" altLang="en-US" smtClean="0"/>
-              <a:t>2022-03-08</a:t>
+              <a:t>2022-03-14</a:t>
             </a:fld>
             <a:endParaRPr lang="ko-KR" altLang="en-US"/>
           </a:p>
@@ -5642,7 +5643,7 @@
           <a:p>
             <a:fld id="{C33163C4-65CF-48D2-8124-E2CEDBD7A0C5}" type="datetimeFigureOut">
               <a:rPr lang="ko-KR" altLang="en-US" smtClean="0"/>
-              <a:t>2022-03-08</a:t>
+              <a:t>2022-03-14</a:t>
             </a:fld>
             <a:endParaRPr lang="ko-KR" altLang="en-US"/>
           </a:p>
@@ -5917,7 +5918,7 @@
           <a:p>
             <a:fld id="{C33163C4-65CF-48D2-8124-E2CEDBD7A0C5}" type="datetimeFigureOut">
               <a:rPr lang="ko-KR" altLang="en-US" smtClean="0"/>
-              <a:t>2022-03-08</a:t>
+              <a:t>2022-03-14</a:t>
             </a:fld>
             <a:endParaRPr lang="ko-KR" altLang="en-US"/>
           </a:p>
@@ -6169,7 +6170,7 @@
           <a:p>
             <a:fld id="{C33163C4-65CF-48D2-8124-E2CEDBD7A0C5}" type="datetimeFigureOut">
               <a:rPr lang="ko-KR" altLang="en-US" smtClean="0"/>
-              <a:t>2022-03-08</a:t>
+              <a:t>2022-03-14</a:t>
             </a:fld>
             <a:endParaRPr lang="ko-KR" altLang="en-US"/>
           </a:p>
@@ -6404,7 +6405,7 @@
           <a:p>
             <a:fld id="{C33163C4-65CF-48D2-8124-E2CEDBD7A0C5}" type="datetimeFigureOut">
               <a:rPr lang="ko-KR" altLang="en-US" smtClean="0"/>
-              <a:t>2022-03-08</a:t>
+              <a:t>2022-03-14</a:t>
             </a:fld>
             <a:endParaRPr lang="ko-KR" altLang="en-US"/>
           </a:p>
@@ -6914,7 +6915,7 @@
           <a:p>
             <a:fld id="{29936F60-83FB-4643-B7D2-F169DF4090A4}" type="datetimeFigureOut">
               <a:rPr lang="ko-KR" altLang="en-US" smtClean="0"/>
-              <a:t>2022-03-08</a:t>
+              <a:t>2022-03-14</a:t>
             </a:fld>
             <a:endParaRPr lang="ko-KR" altLang="en-US"/>
           </a:p>
@@ -7331,6 +7332,30 @@
           </a:p>
         </p:txBody>
       </p:sp>
+      <p:pic>
+        <p:nvPicPr>
+          <p:cNvPr id="2" name="그림 1"/>
+          <p:cNvPicPr>
+            <a:picLocks noChangeAspect="1"/>
+          </p:cNvPicPr>
+          <p:nvPr/>
+        </p:nvPicPr>
+        <p:blipFill>
+          <a:blip r:embed="rId2"/>
+          <a:stretch>
+            <a:fillRect/>
+          </a:stretch>
+        </p:blipFill>
+        <p:spPr>
+          <a:xfrm>
+            <a:off x="2347912" y="2319337"/>
+            <a:ext cx="13592175" cy="9401175"/>
+          </a:xfrm>
+          <a:prstGeom prst="rect">
+            <a:avLst/>
+          </a:prstGeom>
+        </p:spPr>
+      </p:pic>
     </p:spTree>
     <p:extLst>
       <p:ext uri="{BB962C8B-B14F-4D97-AF65-F5344CB8AC3E}">
@@ -7348,6 +7373,1157 @@
       </p:par>
     </p:tnLst>
   </p:timing>
+</p:sld>
+</file>
+
+<file path=ppt/slides/slide2.xml><?xml version="1.0" encoding="utf-8"?>
+<p:sld xmlns:a="http://schemas.openxmlformats.org/drawingml/2006/main" xmlns:r="http://schemas.openxmlformats.org/officeDocument/2006/relationships" xmlns:p="http://schemas.openxmlformats.org/presentationml/2006/main">
+  <p:cSld>
+    <p:spTree>
+      <p:nvGrpSpPr>
+        <p:cNvPr id="1" name=""/>
+        <p:cNvGrpSpPr/>
+        <p:nvPr/>
+      </p:nvGrpSpPr>
+      <p:grpSpPr>
+        <a:xfrm>
+          <a:off x="0" y="0"/>
+          <a:ext cx="0" cy="0"/>
+          <a:chOff x="0" y="0"/>
+          <a:chExt cx="0" cy="0"/>
+        </a:xfrm>
+      </p:grpSpPr>
+      <p:sp>
+        <p:nvSpPr>
+          <p:cNvPr id="3" name="슬라이드 번호 개체 틀 2"/>
+          <p:cNvSpPr>
+            <a:spLocks noGrp="1"/>
+          </p:cNvSpPr>
+          <p:nvPr>
+            <p:ph type="sldNum" sz="quarter" idx="12"/>
+          </p:nvPr>
+        </p:nvSpPr>
+        <p:spPr/>
+        <p:txBody>
+          <a:bodyPr/>
+          <a:lstStyle/>
+          <a:p>
+            <a:fld id="{83FD6675-1775-473F-B12B-1A4033AC630B}" type="slidenum">
+              <a:rPr lang="ko-KR" altLang="en-US" smtClean="0"/>
+              <a:t>2</a:t>
+            </a:fld>
+            <a:endParaRPr lang="ko-KR" altLang="en-US"/>
+          </a:p>
+        </p:txBody>
+      </p:sp>
+      <p:sp>
+        <p:nvSpPr>
+          <p:cNvPr id="4" name="제목 3"/>
+          <p:cNvSpPr>
+            <a:spLocks noGrp="1"/>
+          </p:cNvSpPr>
+          <p:nvPr>
+            <p:ph type="title"/>
+          </p:nvPr>
+        </p:nvSpPr>
+        <p:spPr/>
+        <p:txBody>
+          <a:bodyPr/>
+          <a:lstStyle/>
+          <a:p>
+            <a:endParaRPr lang="ko-KR" altLang="en-US"/>
+          </a:p>
+        </p:txBody>
+      </p:sp>
+      <p:grpSp>
+        <p:nvGrpSpPr>
+          <p:cNvPr id="12" name="그룹 11"/>
+          <p:cNvGrpSpPr/>
+          <p:nvPr/>
+        </p:nvGrpSpPr>
+        <p:grpSpPr>
+          <a:xfrm>
+            <a:off x="1727176" y="1979365"/>
+            <a:ext cx="11693911" cy="4724400"/>
+            <a:chOff x="2051212" y="4546096"/>
+            <a:chExt cx="11693911" cy="4724400"/>
+          </a:xfrm>
+        </p:grpSpPr>
+        <p:grpSp>
+          <p:nvGrpSpPr>
+            <p:cNvPr id="9" name="그룹 8"/>
+            <p:cNvGrpSpPr>
+              <a:grpSpLocks noChangeAspect="1"/>
+            </p:cNvGrpSpPr>
+            <p:nvPr/>
+          </p:nvGrpSpPr>
+          <p:grpSpPr>
+            <a:xfrm>
+              <a:off x="8891972" y="4546096"/>
+              <a:ext cx="4853151" cy="4724400"/>
+              <a:chOff x="1979204" y="1649845"/>
+              <a:chExt cx="5904656" cy="5748009"/>
+            </a:xfrm>
+          </p:grpSpPr>
+          <p:pic>
+            <p:nvPicPr>
+              <p:cNvPr id="6" name="그림 5"/>
+              <p:cNvPicPr>
+                <a:picLocks noChangeAspect="1"/>
+              </p:cNvPicPr>
+              <p:nvPr/>
+            </p:nvPicPr>
+            <p:blipFill>
+              <a:blip r:embed="rId2">
+                <a:extLst>
+                  <a:ext uri="{28A0092B-C50C-407E-A947-70E740481C1C}">
+                    <a14:useLocalDpi xmlns:a14="http://schemas.microsoft.com/office/drawing/2010/main" val="0"/>
+                  </a:ext>
+                </a:extLst>
+              </a:blip>
+              <a:srcRect/>
+              <a:stretch>
+                <a:fillRect/>
+              </a:stretch>
+            </p:blipFill>
+            <p:spPr bwMode="auto">
+              <a:xfrm>
+                <a:off x="1979204" y="2051373"/>
+                <a:ext cx="5904656" cy="4036725"/>
+              </a:xfrm>
+              <a:prstGeom prst="rect">
+                <a:avLst/>
+              </a:prstGeom>
+              <a:noFill/>
+              <a:ln>
+                <a:noFill/>
+              </a:ln>
+            </p:spPr>
+          </p:pic>
+          <p:pic>
+            <p:nvPicPr>
+              <p:cNvPr id="7" name="그림 6"/>
+              <p:cNvPicPr>
+                <a:picLocks noChangeAspect="1"/>
+              </p:cNvPicPr>
+              <p:nvPr/>
+            </p:nvPicPr>
+            <p:blipFill>
+              <a:blip r:embed="rId3">
+                <a:extLst>
+                  <a:ext uri="{28A0092B-C50C-407E-A947-70E740481C1C}">
+                    <a14:useLocalDpi xmlns:a14="http://schemas.microsoft.com/office/drawing/2010/main" val="0"/>
+                  </a:ext>
+                </a:extLst>
+              </a:blip>
+              <a:srcRect/>
+              <a:stretch>
+                <a:fillRect/>
+              </a:stretch>
+            </p:blipFill>
+            <p:spPr bwMode="auto">
+              <a:xfrm>
+                <a:off x="1991867" y="1649845"/>
+                <a:ext cx="5525855" cy="1963085"/>
+              </a:xfrm>
+              <a:prstGeom prst="rect">
+                <a:avLst/>
+              </a:prstGeom>
+              <a:noFill/>
+              <a:ln>
+                <a:noFill/>
+              </a:ln>
+            </p:spPr>
+          </p:pic>
+          <p:pic>
+            <p:nvPicPr>
+              <p:cNvPr id="8" name="그림 7"/>
+              <p:cNvPicPr>
+                <a:picLocks noChangeAspect="1"/>
+              </p:cNvPicPr>
+              <p:nvPr/>
+            </p:nvPicPr>
+            <p:blipFill>
+              <a:blip r:embed="rId4">
+                <a:extLst>
+                  <a:ext uri="{28A0092B-C50C-407E-A947-70E740481C1C}">
+                    <a14:useLocalDpi xmlns:a14="http://schemas.microsoft.com/office/drawing/2010/main" val="0"/>
+                  </a:ext>
+                </a:extLst>
+              </a:blip>
+              <a:srcRect/>
+              <a:stretch>
+                <a:fillRect/>
+              </a:stretch>
+            </p:blipFill>
+            <p:spPr bwMode="auto">
+              <a:xfrm>
+                <a:off x="1991867" y="5132506"/>
+                <a:ext cx="5525856" cy="2265348"/>
+              </a:xfrm>
+              <a:prstGeom prst="rect">
+                <a:avLst/>
+              </a:prstGeom>
+              <a:noFill/>
+              <a:ln>
+                <a:noFill/>
+              </a:ln>
+            </p:spPr>
+          </p:pic>
+        </p:grpSp>
+        <p:pic>
+          <p:nvPicPr>
+            <p:cNvPr id="10" name="그림 9"/>
+            <p:cNvPicPr>
+              <a:picLocks noChangeAspect="1"/>
+            </p:cNvPicPr>
+            <p:nvPr/>
+          </p:nvPicPr>
+          <p:blipFill>
+            <a:blip r:embed="rId5"/>
+            <a:stretch>
+              <a:fillRect/>
+            </a:stretch>
+          </p:blipFill>
+          <p:spPr>
+            <a:xfrm>
+              <a:off x="2051212" y="5058871"/>
+              <a:ext cx="5391670" cy="3698850"/>
+            </a:xfrm>
+            <a:prstGeom prst="rect">
+              <a:avLst/>
+            </a:prstGeom>
+          </p:spPr>
+        </p:pic>
+        <p:sp>
+          <p:nvSpPr>
+            <p:cNvPr id="11" name="오른쪽 화살표 10"/>
+            <p:cNvSpPr/>
+            <p:nvPr/>
+          </p:nvSpPr>
+          <p:spPr>
+            <a:xfrm>
+              <a:off x="7739844" y="5986855"/>
+              <a:ext cx="999715" cy="2207128"/>
+            </a:xfrm>
+            <a:prstGeom prst="rightArrow">
+              <a:avLst/>
+            </a:prstGeom>
+            <a:solidFill>
+              <a:schemeClr val="accent1">
+                <a:lumMod val="60000"/>
+                <a:lumOff val="40000"/>
+              </a:schemeClr>
+            </a:solidFill>
+            <a:ln>
+              <a:noFill/>
+            </a:ln>
+          </p:spPr>
+          <p:style>
+            <a:lnRef idx="2">
+              <a:schemeClr val="accent1">
+                <a:shade val="50000"/>
+              </a:schemeClr>
+            </a:lnRef>
+            <a:fillRef idx="1">
+              <a:schemeClr val="accent1"/>
+            </a:fillRef>
+            <a:effectRef idx="0">
+              <a:schemeClr val="accent1"/>
+            </a:effectRef>
+            <a:fontRef idx="minor">
+              <a:schemeClr val="lt1"/>
+            </a:fontRef>
+          </p:style>
+          <p:txBody>
+            <a:bodyPr rtlCol="0" anchor="ctr"/>
+            <a:lstStyle/>
+            <a:p>
+              <a:pPr algn="ctr"/>
+              <a:r>
+                <a:rPr lang="ko-KR" altLang="en-US" b="1" smtClean="0"/>
+                <a:t>분석</a:t>
+              </a:r>
+              <a:endParaRPr lang="ko-KR" altLang="en-US" b="1"/>
+            </a:p>
+          </p:txBody>
+        </p:sp>
+      </p:grpSp>
+      <p:grpSp>
+        <p:nvGrpSpPr>
+          <p:cNvPr id="13" name="그룹 12"/>
+          <p:cNvGrpSpPr/>
+          <p:nvPr/>
+        </p:nvGrpSpPr>
+        <p:grpSpPr>
+          <a:xfrm>
+            <a:off x="3527376" y="7222911"/>
+            <a:ext cx="13164671" cy="5397105"/>
+            <a:chOff x="3276600" y="2993860"/>
+            <a:chExt cx="13164671" cy="5397105"/>
+          </a:xfrm>
+        </p:grpSpPr>
+        <p:sp>
+          <p:nvSpPr>
+            <p:cNvPr id="14" name="직사각형 13"/>
+            <p:cNvSpPr/>
+            <p:nvPr/>
+          </p:nvSpPr>
+          <p:spPr>
+            <a:xfrm>
+              <a:off x="5791199" y="2993860"/>
+              <a:ext cx="1631577" cy="484094"/>
+            </a:xfrm>
+            <a:prstGeom prst="rect">
+              <a:avLst/>
+            </a:prstGeom>
+          </p:spPr>
+          <p:style>
+            <a:lnRef idx="2">
+              <a:schemeClr val="accent1">
+                <a:shade val="50000"/>
+              </a:schemeClr>
+            </a:lnRef>
+            <a:fillRef idx="1">
+              <a:schemeClr val="accent1"/>
+            </a:fillRef>
+            <a:effectRef idx="0">
+              <a:schemeClr val="accent1"/>
+            </a:effectRef>
+            <a:fontRef idx="minor">
+              <a:schemeClr val="lt1"/>
+            </a:fontRef>
+          </p:style>
+          <p:txBody>
+            <a:bodyPr rtlCol="0" anchor="ctr"/>
+            <a:lstStyle/>
+            <a:p>
+              <a:pPr algn="ctr"/>
+              <a:r>
+                <a:rPr lang="en-US" altLang="ko-KR" sz="2800" smtClean="0"/>
+                <a:t>Updater</a:t>
+              </a:r>
+              <a:endParaRPr lang="ko-KR" altLang="en-US" sz="2800"/>
+            </a:p>
+          </p:txBody>
+        </p:sp>
+        <p:sp>
+          <p:nvSpPr>
+            <p:cNvPr id="15" name="직사각형 14"/>
+            <p:cNvSpPr/>
+            <p:nvPr/>
+          </p:nvSpPr>
+          <p:spPr>
+            <a:xfrm>
+              <a:off x="10703859" y="2993860"/>
+              <a:ext cx="1452282" cy="484094"/>
+            </a:xfrm>
+            <a:prstGeom prst="rect">
+              <a:avLst/>
+            </a:prstGeom>
+          </p:spPr>
+          <p:style>
+            <a:lnRef idx="2">
+              <a:schemeClr val="accent1">
+                <a:shade val="50000"/>
+              </a:schemeClr>
+            </a:lnRef>
+            <a:fillRef idx="1">
+              <a:schemeClr val="accent1"/>
+            </a:fillRef>
+            <a:effectRef idx="0">
+              <a:schemeClr val="accent1"/>
+            </a:effectRef>
+            <a:fontRef idx="minor">
+              <a:schemeClr val="lt1"/>
+            </a:fontRef>
+          </p:style>
+          <p:txBody>
+            <a:bodyPr rtlCol="0" anchor="ctr"/>
+            <a:lstStyle/>
+            <a:p>
+              <a:pPr algn="ctr"/>
+              <a:r>
+                <a:rPr lang="en-US" altLang="ko-KR" sz="2800" smtClean="0"/>
+                <a:t>BL</a:t>
+              </a:r>
+              <a:endParaRPr lang="ko-KR" altLang="en-US" sz="2800"/>
+            </a:p>
+          </p:txBody>
+        </p:sp>
+        <p:grpSp>
+          <p:nvGrpSpPr>
+            <p:cNvPr id="16" name="그룹 15"/>
+            <p:cNvGrpSpPr/>
+            <p:nvPr/>
+          </p:nvGrpSpPr>
+          <p:grpSpPr>
+            <a:xfrm>
+              <a:off x="6606988" y="3460376"/>
+              <a:ext cx="4823012" cy="4930589"/>
+              <a:chOff x="6606988" y="3047999"/>
+              <a:chExt cx="4823012" cy="7602071"/>
+            </a:xfrm>
+          </p:grpSpPr>
+          <p:cxnSp>
+            <p:nvCxnSpPr>
+              <p:cNvPr id="39" name="직선 연결선 38"/>
+              <p:cNvCxnSpPr/>
+              <p:nvPr/>
+            </p:nvCxnSpPr>
+            <p:spPr>
+              <a:xfrm>
+                <a:off x="6606988" y="3047999"/>
+                <a:ext cx="0" cy="7602071"/>
+              </a:xfrm>
+              <a:prstGeom prst="line">
+                <a:avLst/>
+              </a:prstGeom>
+              <a:ln w="57150"/>
+            </p:spPr>
+            <p:style>
+              <a:lnRef idx="1">
+                <a:schemeClr val="accent1"/>
+              </a:lnRef>
+              <a:fillRef idx="0">
+                <a:schemeClr val="accent1"/>
+              </a:fillRef>
+              <a:effectRef idx="0">
+                <a:schemeClr val="accent1"/>
+              </a:effectRef>
+              <a:fontRef idx="minor">
+                <a:schemeClr val="tx1"/>
+              </a:fontRef>
+            </p:style>
+          </p:cxnSp>
+          <p:cxnSp>
+            <p:nvCxnSpPr>
+              <p:cNvPr id="40" name="직선 연결선 39"/>
+              <p:cNvCxnSpPr/>
+              <p:nvPr/>
+            </p:nvCxnSpPr>
+            <p:spPr>
+              <a:xfrm>
+                <a:off x="11430000" y="3047999"/>
+                <a:ext cx="0" cy="7602071"/>
+              </a:xfrm>
+              <a:prstGeom prst="line">
+                <a:avLst/>
+              </a:prstGeom>
+              <a:ln w="57150"/>
+            </p:spPr>
+            <p:style>
+              <a:lnRef idx="1">
+                <a:schemeClr val="accent1"/>
+              </a:lnRef>
+              <a:fillRef idx="0">
+                <a:schemeClr val="accent1"/>
+              </a:fillRef>
+              <a:effectRef idx="0">
+                <a:schemeClr val="accent1"/>
+              </a:effectRef>
+              <a:fontRef idx="minor">
+                <a:schemeClr val="tx1"/>
+              </a:fontRef>
+            </p:style>
+          </p:cxnSp>
+        </p:grpSp>
+        <p:grpSp>
+          <p:nvGrpSpPr>
+            <p:cNvPr id="17" name="그룹 16"/>
+            <p:cNvGrpSpPr/>
+            <p:nvPr/>
+          </p:nvGrpSpPr>
+          <p:grpSpPr>
+            <a:xfrm>
+              <a:off x="6624917" y="3649333"/>
+              <a:ext cx="4823012" cy="384784"/>
+              <a:chOff x="2644588" y="3039734"/>
+              <a:chExt cx="4823012" cy="384784"/>
+            </a:xfrm>
+          </p:grpSpPr>
+          <p:sp>
+            <p:nvSpPr>
+              <p:cNvPr id="37" name="TextBox 36"/>
+              <p:cNvSpPr txBox="1"/>
+              <p:nvPr/>
+            </p:nvSpPr>
+            <p:spPr>
+              <a:xfrm>
+                <a:off x="3348320" y="3039734"/>
+                <a:ext cx="3630702" cy="338554"/>
+              </a:xfrm>
+              <a:prstGeom prst="rect">
+                <a:avLst/>
+              </a:prstGeom>
+              <a:noFill/>
+            </p:spPr>
+            <p:txBody>
+              <a:bodyPr wrap="square" rtlCol="0">
+                <a:spAutoFit/>
+              </a:bodyPr>
+              <a:lstStyle/>
+              <a:p>
+                <a:pPr algn="ctr"/>
+                <a:r>
+                  <a:rPr lang="en-US" altLang="ko-KR" sz="1600" b="1" smtClean="0"/>
+                  <a:t>0x53 0x04</a:t>
+                </a:r>
+              </a:p>
+            </p:txBody>
+          </p:sp>
+          <p:cxnSp>
+            <p:nvCxnSpPr>
+              <p:cNvPr id="38" name="직선 화살표 연결선 37"/>
+              <p:cNvCxnSpPr/>
+              <p:nvPr/>
+            </p:nvCxnSpPr>
+            <p:spPr>
+              <a:xfrm>
+                <a:off x="2644588" y="3424518"/>
+                <a:ext cx="4823012" cy="0"/>
+              </a:xfrm>
+              <a:prstGeom prst="straightConnector1">
+                <a:avLst/>
+              </a:prstGeom>
+              <a:ln w="76200">
+                <a:tailEnd type="triangle"/>
+              </a:ln>
+            </p:spPr>
+            <p:style>
+              <a:lnRef idx="1">
+                <a:schemeClr val="accent1"/>
+              </a:lnRef>
+              <a:fillRef idx="0">
+                <a:schemeClr val="accent1"/>
+              </a:fillRef>
+              <a:effectRef idx="0">
+                <a:schemeClr val="accent1"/>
+              </a:effectRef>
+              <a:fontRef idx="minor">
+                <a:schemeClr val="tx1"/>
+              </a:fontRef>
+            </p:style>
+          </p:cxnSp>
+        </p:grpSp>
+        <p:sp>
+          <p:nvSpPr>
+            <p:cNvPr id="18" name="TextBox 17"/>
+            <p:cNvSpPr txBox="1"/>
+            <p:nvPr/>
+          </p:nvSpPr>
+          <p:spPr>
+            <a:xfrm>
+              <a:off x="11483786" y="3668168"/>
+              <a:ext cx="2142564" cy="1077218"/>
+            </a:xfrm>
+            <a:prstGeom prst="rect">
+              <a:avLst/>
+            </a:prstGeom>
+            <a:noFill/>
+          </p:spPr>
+          <p:txBody>
+            <a:bodyPr wrap="square" rtlCol="0">
+              <a:spAutoFit/>
+            </a:bodyPr>
+            <a:lstStyle/>
+            <a:p>
+              <a:pPr>
+                <a:lnSpc>
+                  <a:spcPct val="200000"/>
+                </a:lnSpc>
+              </a:pPr>
+              <a:r>
+                <a:rPr lang="en-US" altLang="ko-KR" sz="1600" b="1" smtClean="0"/>
+                <a:t>Erase App Sector</a:t>
+              </a:r>
+            </a:p>
+            <a:p>
+              <a:pPr>
+                <a:lnSpc>
+                  <a:spcPct val="200000"/>
+                </a:lnSpc>
+              </a:pPr>
+              <a:r>
+                <a:rPr lang="en-US" altLang="ko-KR" sz="1600" b="1" smtClean="0"/>
+                <a:t>Erase Finished</a:t>
+              </a:r>
+              <a:endParaRPr lang="ko-KR" altLang="en-US" sz="1600" b="1"/>
+            </a:p>
+          </p:txBody>
+        </p:sp>
+        <p:grpSp>
+          <p:nvGrpSpPr>
+            <p:cNvPr id="19" name="그룹 18"/>
+            <p:cNvGrpSpPr/>
+            <p:nvPr/>
+          </p:nvGrpSpPr>
+          <p:grpSpPr>
+            <a:xfrm>
+              <a:off x="6606987" y="4170129"/>
+              <a:ext cx="4823012" cy="356350"/>
+              <a:chOff x="2644588" y="3866027"/>
+              <a:chExt cx="4823012" cy="356350"/>
+            </a:xfrm>
+          </p:grpSpPr>
+          <p:cxnSp>
+            <p:nvCxnSpPr>
+              <p:cNvPr id="35" name="직선 화살표 연결선 34"/>
+              <p:cNvCxnSpPr/>
+              <p:nvPr/>
+            </p:nvCxnSpPr>
+            <p:spPr>
+              <a:xfrm flipH="1">
+                <a:off x="2644588" y="4222377"/>
+                <a:ext cx="4823012" cy="0"/>
+              </a:xfrm>
+              <a:prstGeom prst="straightConnector1">
+                <a:avLst/>
+              </a:prstGeom>
+              <a:ln w="76200">
+                <a:tailEnd type="triangle"/>
+              </a:ln>
+            </p:spPr>
+            <p:style>
+              <a:lnRef idx="1">
+                <a:schemeClr val="accent1"/>
+              </a:lnRef>
+              <a:fillRef idx="0">
+                <a:schemeClr val="accent1"/>
+              </a:fillRef>
+              <a:effectRef idx="0">
+                <a:schemeClr val="accent1"/>
+              </a:effectRef>
+              <a:fontRef idx="minor">
+                <a:schemeClr val="tx1"/>
+              </a:fontRef>
+            </p:style>
+          </p:cxnSp>
+          <p:sp>
+            <p:nvSpPr>
+              <p:cNvPr id="36" name="TextBox 35"/>
+              <p:cNvSpPr txBox="1"/>
+              <p:nvPr/>
+            </p:nvSpPr>
+            <p:spPr>
+              <a:xfrm>
+                <a:off x="3841377" y="3866027"/>
+                <a:ext cx="2680447" cy="338554"/>
+              </a:xfrm>
+              <a:prstGeom prst="rect">
+                <a:avLst/>
+              </a:prstGeom>
+              <a:noFill/>
+            </p:spPr>
+            <p:txBody>
+              <a:bodyPr wrap="square" rtlCol="0">
+                <a:spAutoFit/>
+              </a:bodyPr>
+              <a:lstStyle/>
+              <a:p>
+                <a:pPr algn="ctr"/>
+                <a:r>
+                  <a:rPr lang="en-US" altLang="ko-KR" sz="1600" b="1" smtClean="0"/>
+                  <a:t>0x41 0x31 0x31 (ACK)</a:t>
+                </a:r>
+              </a:p>
+            </p:txBody>
+          </p:sp>
+        </p:grpSp>
+        <p:grpSp>
+          <p:nvGrpSpPr>
+            <p:cNvPr id="20" name="그룹 19"/>
+            <p:cNvGrpSpPr/>
+            <p:nvPr/>
+          </p:nvGrpSpPr>
+          <p:grpSpPr>
+            <a:xfrm>
+              <a:off x="6624916" y="5460262"/>
+              <a:ext cx="4823012" cy="365949"/>
+              <a:chOff x="2644588" y="3058569"/>
+              <a:chExt cx="4823012" cy="365949"/>
+            </a:xfrm>
+          </p:grpSpPr>
+          <p:sp>
+            <p:nvSpPr>
+              <p:cNvPr id="33" name="TextBox 32"/>
+              <p:cNvSpPr txBox="1"/>
+              <p:nvPr/>
+            </p:nvSpPr>
+            <p:spPr>
+              <a:xfrm>
+                <a:off x="3890683" y="3058569"/>
+                <a:ext cx="2680447" cy="338554"/>
+              </a:xfrm>
+              <a:prstGeom prst="rect">
+                <a:avLst/>
+              </a:prstGeom>
+              <a:noFill/>
+            </p:spPr>
+            <p:txBody>
+              <a:bodyPr wrap="square" rtlCol="0">
+                <a:spAutoFit/>
+              </a:bodyPr>
+              <a:lstStyle/>
+              <a:p>
+                <a:pPr algn="ctr"/>
+                <a:r>
+                  <a:rPr lang="en-US" altLang="ko-KR" sz="1600" b="1" smtClean="0"/>
+                  <a:t>Tx App Binary</a:t>
+                </a:r>
+              </a:p>
+            </p:txBody>
+          </p:sp>
+          <p:cxnSp>
+            <p:nvCxnSpPr>
+              <p:cNvPr id="34" name="직선 화살표 연결선 33"/>
+              <p:cNvCxnSpPr/>
+              <p:nvPr/>
+            </p:nvCxnSpPr>
+            <p:spPr>
+              <a:xfrm>
+                <a:off x="2644588" y="3424518"/>
+                <a:ext cx="4823012" cy="0"/>
+              </a:xfrm>
+              <a:prstGeom prst="straightConnector1">
+                <a:avLst/>
+              </a:prstGeom>
+              <a:ln w="76200">
+                <a:tailEnd type="triangle"/>
+              </a:ln>
+            </p:spPr>
+            <p:style>
+              <a:lnRef idx="1">
+                <a:schemeClr val="accent1"/>
+              </a:lnRef>
+              <a:fillRef idx="0">
+                <a:schemeClr val="accent1"/>
+              </a:fillRef>
+              <a:effectRef idx="0">
+                <a:schemeClr val="accent1"/>
+              </a:effectRef>
+              <a:fontRef idx="minor">
+                <a:schemeClr val="tx1"/>
+              </a:fontRef>
+            </p:style>
+          </p:cxnSp>
+        </p:grpSp>
+        <p:sp>
+          <p:nvSpPr>
+            <p:cNvPr id="21" name="TextBox 20"/>
+            <p:cNvSpPr txBox="1"/>
+            <p:nvPr/>
+          </p:nvSpPr>
+          <p:spPr>
+            <a:xfrm>
+              <a:off x="11483786" y="5667571"/>
+              <a:ext cx="4240308" cy="978729"/>
+            </a:xfrm>
+            <a:prstGeom prst="rect">
+              <a:avLst/>
+            </a:prstGeom>
+            <a:noFill/>
+          </p:spPr>
+          <p:txBody>
+            <a:bodyPr wrap="square" rtlCol="0">
+              <a:spAutoFit/>
+            </a:bodyPr>
+            <a:lstStyle>
+              <a:defPPr>
+                <a:defRPr lang="ko-KR"/>
+              </a:defPPr>
+              <a:lvl1pPr>
+                <a:lnSpc>
+                  <a:spcPct val="120000"/>
+                </a:lnSpc>
+                <a:defRPr sz="1600" b="1"/>
+              </a:lvl1pPr>
+            </a:lstStyle>
+            <a:p>
+              <a:r>
+                <a:rPr lang="en-US" altLang="ko-KR"/>
+                <a:t>Write App</a:t>
+              </a:r>
+            </a:p>
+            <a:p>
+              <a:r>
+                <a:rPr lang="en-US" altLang="ko-KR"/>
+                <a:t>Restore Registor when write app finished</a:t>
+              </a:r>
+            </a:p>
+            <a:p>
+              <a:r>
+                <a:rPr lang="en-US" altLang="ko-KR"/>
+                <a:t>Write App Finished</a:t>
+              </a:r>
+              <a:endParaRPr lang="ko-KR" altLang="en-US"/>
+            </a:p>
+          </p:txBody>
+        </p:sp>
+        <p:grpSp>
+          <p:nvGrpSpPr>
+            <p:cNvPr id="22" name="그룹 21"/>
+            <p:cNvGrpSpPr/>
+            <p:nvPr/>
+          </p:nvGrpSpPr>
+          <p:grpSpPr>
+            <a:xfrm>
+              <a:off x="6606987" y="6106582"/>
+              <a:ext cx="4823012" cy="355618"/>
+              <a:chOff x="2644588" y="3866759"/>
+              <a:chExt cx="4823012" cy="355618"/>
+            </a:xfrm>
+          </p:grpSpPr>
+          <p:cxnSp>
+            <p:nvCxnSpPr>
+              <p:cNvPr id="31" name="직선 화살표 연결선 30"/>
+              <p:cNvCxnSpPr/>
+              <p:nvPr/>
+            </p:nvCxnSpPr>
+            <p:spPr>
+              <a:xfrm flipH="1">
+                <a:off x="2644588" y="4222377"/>
+                <a:ext cx="4823012" cy="0"/>
+              </a:xfrm>
+              <a:prstGeom prst="straightConnector1">
+                <a:avLst/>
+              </a:prstGeom>
+              <a:ln w="76200">
+                <a:tailEnd type="triangle"/>
+              </a:ln>
+            </p:spPr>
+            <p:style>
+              <a:lnRef idx="1">
+                <a:schemeClr val="accent1"/>
+              </a:lnRef>
+              <a:fillRef idx="0">
+                <a:schemeClr val="accent1"/>
+              </a:fillRef>
+              <a:effectRef idx="0">
+                <a:schemeClr val="accent1"/>
+              </a:effectRef>
+              <a:fontRef idx="minor">
+                <a:schemeClr val="tx1"/>
+              </a:fontRef>
+            </p:style>
+          </p:cxnSp>
+          <p:sp>
+            <p:nvSpPr>
+              <p:cNvPr id="32" name="TextBox 31"/>
+              <p:cNvSpPr txBox="1"/>
+              <p:nvPr/>
+            </p:nvSpPr>
+            <p:spPr>
+              <a:xfrm>
+                <a:off x="3890682" y="3866759"/>
+                <a:ext cx="2680447" cy="338554"/>
+              </a:xfrm>
+              <a:prstGeom prst="rect">
+                <a:avLst/>
+              </a:prstGeom>
+              <a:noFill/>
+            </p:spPr>
+            <p:txBody>
+              <a:bodyPr wrap="square" rtlCol="0">
+                <a:spAutoFit/>
+              </a:bodyPr>
+              <a:lstStyle/>
+              <a:p>
+                <a:pPr algn="ctr"/>
+                <a:r>
+                  <a:rPr lang="en-US" altLang="ko-KR" sz="1600" b="1"/>
+                  <a:t>0x41(ACK)</a:t>
+                </a:r>
+              </a:p>
+            </p:txBody>
+          </p:sp>
+        </p:grpSp>
+        <p:grpSp>
+          <p:nvGrpSpPr>
+            <p:cNvPr id="23" name="그룹 22"/>
+            <p:cNvGrpSpPr/>
+            <p:nvPr/>
+          </p:nvGrpSpPr>
+          <p:grpSpPr>
+            <a:xfrm>
+              <a:off x="6642846" y="6948529"/>
+              <a:ext cx="4823012" cy="365949"/>
+              <a:chOff x="2644588" y="3058569"/>
+              <a:chExt cx="4823012" cy="365949"/>
+            </a:xfrm>
+          </p:grpSpPr>
+          <p:sp>
+            <p:nvSpPr>
+              <p:cNvPr id="29" name="TextBox 28"/>
+              <p:cNvSpPr txBox="1"/>
+              <p:nvPr/>
+            </p:nvSpPr>
+            <p:spPr>
+              <a:xfrm>
+                <a:off x="3890683" y="3058569"/>
+                <a:ext cx="2680447" cy="338554"/>
+              </a:xfrm>
+              <a:prstGeom prst="rect">
+                <a:avLst/>
+              </a:prstGeom>
+              <a:noFill/>
+            </p:spPr>
+            <p:txBody>
+              <a:bodyPr wrap="square" rtlCol="0">
+                <a:spAutoFit/>
+              </a:bodyPr>
+              <a:lstStyle/>
+              <a:p>
+                <a:pPr algn="ctr"/>
+                <a:r>
+                  <a:rPr lang="en-US" altLang="ko-KR" sz="1600" b="1" smtClean="0"/>
+                  <a:t>Tx Vector Binary</a:t>
+                </a:r>
+              </a:p>
+            </p:txBody>
+          </p:sp>
+          <p:cxnSp>
+            <p:nvCxnSpPr>
+              <p:cNvPr id="30" name="직선 화살표 연결선 29"/>
+              <p:cNvCxnSpPr/>
+              <p:nvPr/>
+            </p:nvCxnSpPr>
+            <p:spPr>
+              <a:xfrm>
+                <a:off x="2644588" y="3424518"/>
+                <a:ext cx="4823012" cy="0"/>
+              </a:xfrm>
+              <a:prstGeom prst="straightConnector1">
+                <a:avLst/>
+              </a:prstGeom>
+              <a:ln w="76200">
+                <a:tailEnd type="triangle"/>
+              </a:ln>
+            </p:spPr>
+            <p:style>
+              <a:lnRef idx="1">
+                <a:schemeClr val="accent1"/>
+              </a:lnRef>
+              <a:fillRef idx="0">
+                <a:schemeClr val="accent1"/>
+              </a:fillRef>
+              <a:effectRef idx="0">
+                <a:schemeClr val="accent1"/>
+              </a:effectRef>
+              <a:fontRef idx="minor">
+                <a:schemeClr val="tx1"/>
+              </a:fontRef>
+            </p:style>
+          </p:cxnSp>
+        </p:grpSp>
+        <p:sp>
+          <p:nvSpPr>
+            <p:cNvPr id="24" name="TextBox 23"/>
+            <p:cNvSpPr txBox="1"/>
+            <p:nvPr/>
+          </p:nvSpPr>
+          <p:spPr>
+            <a:xfrm>
+              <a:off x="11501715" y="7155838"/>
+              <a:ext cx="4939556" cy="978729"/>
+            </a:xfrm>
+            <a:prstGeom prst="rect">
+              <a:avLst/>
+            </a:prstGeom>
+            <a:noFill/>
+          </p:spPr>
+          <p:txBody>
+            <a:bodyPr wrap="square" rtlCol="0">
+              <a:spAutoFit/>
+            </a:bodyPr>
+            <a:lstStyle>
+              <a:defPPr>
+                <a:defRPr lang="ko-KR"/>
+              </a:defPPr>
+              <a:lvl1pPr>
+                <a:lnSpc>
+                  <a:spcPct val="120000"/>
+                </a:lnSpc>
+                <a:defRPr sz="1600" b="1"/>
+              </a:lvl1pPr>
+            </a:lstStyle>
+            <a:p>
+              <a:r>
+                <a:rPr lang="en-US" altLang="ko-KR"/>
+                <a:t>Write </a:t>
+              </a:r>
+              <a:r>
+                <a:rPr lang="en-US" altLang="ko-KR" smtClean="0"/>
+                <a:t>Vector</a:t>
+              </a:r>
+              <a:endParaRPr lang="en-US" altLang="ko-KR"/>
+            </a:p>
+            <a:p>
+              <a:r>
+                <a:rPr lang="en-US" altLang="ko-KR"/>
+                <a:t>Restore </a:t>
+              </a:r>
+              <a:r>
+                <a:rPr lang="en-US" altLang="ko-KR" smtClean="0"/>
+                <a:t>Reset Vector </a:t>
+              </a:r>
+              <a:r>
+                <a:rPr lang="en-US" altLang="ko-KR"/>
+                <a:t>when write </a:t>
+              </a:r>
+              <a:r>
+                <a:rPr lang="en-US" altLang="ko-KR" smtClean="0"/>
+                <a:t>vector </a:t>
+              </a:r>
+              <a:r>
+                <a:rPr lang="en-US" altLang="ko-KR"/>
+                <a:t>finished</a:t>
+              </a:r>
+            </a:p>
+            <a:p>
+              <a:r>
+                <a:rPr lang="en-US" altLang="ko-KR"/>
+                <a:t>Write </a:t>
+              </a:r>
+              <a:r>
+                <a:rPr lang="en-US" altLang="ko-KR" smtClean="0"/>
+                <a:t>Vector </a:t>
+              </a:r>
+              <a:r>
+                <a:rPr lang="en-US" altLang="ko-KR"/>
+                <a:t>Finished</a:t>
+              </a:r>
+              <a:endParaRPr lang="ko-KR" altLang="en-US"/>
+            </a:p>
+          </p:txBody>
+        </p:sp>
+        <p:grpSp>
+          <p:nvGrpSpPr>
+            <p:cNvPr id="25" name="그룹 24"/>
+            <p:cNvGrpSpPr/>
+            <p:nvPr/>
+          </p:nvGrpSpPr>
+          <p:grpSpPr>
+            <a:xfrm>
+              <a:off x="6624917" y="7594849"/>
+              <a:ext cx="4823012" cy="355618"/>
+              <a:chOff x="2644588" y="3866759"/>
+              <a:chExt cx="4823012" cy="355618"/>
+            </a:xfrm>
+          </p:grpSpPr>
+          <p:cxnSp>
+            <p:nvCxnSpPr>
+              <p:cNvPr id="27" name="직선 화살표 연결선 26"/>
+              <p:cNvCxnSpPr/>
+              <p:nvPr/>
+            </p:nvCxnSpPr>
+            <p:spPr>
+              <a:xfrm flipH="1">
+                <a:off x="2644588" y="4222377"/>
+                <a:ext cx="4823012" cy="0"/>
+              </a:xfrm>
+              <a:prstGeom prst="straightConnector1">
+                <a:avLst/>
+              </a:prstGeom>
+              <a:ln w="76200">
+                <a:tailEnd type="triangle"/>
+              </a:ln>
+            </p:spPr>
+            <p:style>
+              <a:lnRef idx="1">
+                <a:schemeClr val="accent1"/>
+              </a:lnRef>
+              <a:fillRef idx="0">
+                <a:schemeClr val="accent1"/>
+              </a:fillRef>
+              <a:effectRef idx="0">
+                <a:schemeClr val="accent1"/>
+              </a:effectRef>
+              <a:fontRef idx="minor">
+                <a:schemeClr val="tx1"/>
+              </a:fontRef>
+            </p:style>
+          </p:cxnSp>
+          <p:sp>
+            <p:nvSpPr>
+              <p:cNvPr id="28" name="TextBox 27"/>
+              <p:cNvSpPr txBox="1"/>
+              <p:nvPr/>
+            </p:nvSpPr>
+            <p:spPr>
+              <a:xfrm>
+                <a:off x="3890682" y="3866759"/>
+                <a:ext cx="2680447" cy="338554"/>
+              </a:xfrm>
+              <a:prstGeom prst="rect">
+                <a:avLst/>
+              </a:prstGeom>
+              <a:noFill/>
+            </p:spPr>
+            <p:txBody>
+              <a:bodyPr wrap="square" rtlCol="0">
+                <a:spAutoFit/>
+              </a:bodyPr>
+              <a:lstStyle/>
+              <a:p>
+                <a:pPr algn="ctr"/>
+                <a:r>
+                  <a:rPr lang="en-US" altLang="ko-KR" sz="1600" b="1"/>
+                  <a:t>0x41(ACK)</a:t>
+                </a:r>
+              </a:p>
+            </p:txBody>
+          </p:sp>
+        </p:grpSp>
+        <p:sp>
+          <p:nvSpPr>
+            <p:cNvPr id="26" name="TextBox 25"/>
+            <p:cNvSpPr txBox="1"/>
+            <p:nvPr/>
+          </p:nvSpPr>
+          <p:spPr>
+            <a:xfrm>
+              <a:off x="3276600" y="3837445"/>
+              <a:ext cx="3603813" cy="338554"/>
+            </a:xfrm>
+            <a:prstGeom prst="rect">
+              <a:avLst/>
+            </a:prstGeom>
+            <a:noFill/>
+          </p:spPr>
+          <p:txBody>
+            <a:bodyPr wrap="square" rtlCol="0">
+              <a:spAutoFit/>
+            </a:bodyPr>
+            <a:lstStyle/>
+            <a:p>
+              <a:pPr algn="ctr"/>
+              <a:r>
+                <a:rPr lang="en-US" altLang="ko-KR" sz="1600" b="1"/>
+                <a:t>Erase </a:t>
+              </a:r>
+              <a:r>
+                <a:rPr lang="en-US" altLang="ko-KR" sz="1600" b="1" smtClean="0"/>
+                <a:t>App </a:t>
+              </a:r>
+              <a:r>
+                <a:rPr lang="en-US" altLang="ko-KR" sz="1600" b="1"/>
+                <a:t>Sector Command</a:t>
+              </a:r>
+            </a:p>
+          </p:txBody>
+        </p:sp>
+      </p:grpSp>
+    </p:spTree>
+    <p:extLst>
+      <p:ext uri="{BB962C8B-B14F-4D97-AF65-F5344CB8AC3E}">
+        <p14:creationId xmlns:p14="http://schemas.microsoft.com/office/powerpoint/2010/main" val="4201645198"/>
+      </p:ext>
+    </p:extLst>
+  </p:cSld>
+  <p:clrMapOvr>
+    <a:masterClrMapping/>
+  </p:clrMapOvr>
 </p:sld>
 </file>
 

</xml_diff>